<commit_message>
update 05 and 06
</commit_message>
<xml_diff>
--- a/05Infer/02InferSpeedUp/01KVCache.pptx
+++ b/05Infer/02InferSpeedUp/01KVCache.pptx
@@ -21340,7 +21340,7 @@
         </p:spPr>
         <p:txBody>
           <a:bodyPr lIns="0" tIns="0" rIns="0" bIns="0">
-            <a:normAutofit/>
+            <a:normAutofit fontScale="92500"/>
           </a:bodyPr>
           <a:lstStyle>
             <a:lvl1pPr marL="0" indent="0" algn="l" defTabSz="914400" rtl="0" eaLnBrk="1" latinLnBrk="0" hangingPunct="1">
@@ -28240,6 +28240,36 @@
           <a:chExt cx="0" cy="0"/>
         </a:xfrm>
       </p:grpSpPr>
+      <p:pic>
+        <p:nvPicPr>
+          <p:cNvPr id="8" name="图片 7">
+            <a:extLst>
+              <a:ext uri="{FF2B5EF4-FFF2-40B4-BE49-F238E27FC236}">
+                <a16:creationId xmlns:a16="http://schemas.microsoft.com/office/drawing/2014/main" id="{28783DF6-17F7-520A-52EE-FC8AA26D5B3C}"/>
+              </a:ext>
+            </a:extLst>
+          </p:cNvPr>
+          <p:cNvPicPr>
+            <a:picLocks noChangeAspect="1"/>
+          </p:cNvPicPr>
+          <p:nvPr/>
+        </p:nvPicPr>
+        <p:blipFill>
+          <a:blip r:embed="rId3"/>
+          <a:stretch>
+            <a:fillRect/>
+          </a:stretch>
+        </p:blipFill>
+        <p:spPr>
+          <a:xfrm>
+            <a:off x="0" y="0"/>
+            <a:ext cx="12192000" cy="6858000"/>
+          </a:xfrm>
+          <a:prstGeom prst="rect">
+            <a:avLst/>
+          </a:prstGeom>
+        </p:spPr>
+      </p:pic>
       <p:sp>
         <p:nvSpPr>
           <p:cNvPr id="7" name="矩形 6">
@@ -28315,7 +28345,7 @@
         </p:nvSpPr>
         <p:spPr>
           <a:xfrm>
-            <a:off x="3864952" y="1414660"/>
+            <a:off x="3864952" y="1503078"/>
             <a:ext cx="5368258" cy="979488"/>
           </a:xfrm>
           <a:prstGeom prst="rect">
@@ -28494,7 +28524,7 @@
             <a:r>
               <a:rPr lang="en-US" altLang="zh-CN" sz="5400" dirty="0">
                 <a:solidFill>
-                  <a:schemeClr val="bg1"/>
+                  <a:srgbClr val="374153"/>
                 </a:solidFill>
                 <a:latin typeface="ACGN-MiaoGB-Flash" panose="02020300000000000000" pitchFamily="18" charset="-122"/>
                 <a:ea typeface="ACGN-MiaoGB-Flash" panose="02020300000000000000" pitchFamily="18" charset="-122"/>
@@ -28504,7 +28534,7 @@
             <a:r>
               <a:rPr lang="zh-CN" altLang="en-US" sz="5400" dirty="0">
                 <a:solidFill>
-                  <a:schemeClr val="bg1"/>
+                  <a:srgbClr val="374153"/>
                 </a:solidFill>
                 <a:latin typeface="ACGN-MiaoGB-Flash" panose="02020300000000000000" pitchFamily="18" charset="-122"/>
                 <a:ea typeface="ACGN-MiaoGB-Flash" panose="02020300000000000000" pitchFamily="18" charset="-122"/>
@@ -28514,7 +28544,7 @@
             <a:r>
               <a:rPr lang="en-US" altLang="zh-CN" sz="5400" dirty="0">
                 <a:solidFill>
-                  <a:schemeClr val="bg1"/>
+                  <a:srgbClr val="374153"/>
                 </a:solidFill>
                 <a:latin typeface="ACGN-MiaoGB-Flash" panose="02020300000000000000" pitchFamily="18" charset="-122"/>
                 <a:ea typeface="ACGN-MiaoGB-Flash" panose="02020300000000000000" pitchFamily="18" charset="-122"/>
@@ -28524,7 +28554,7 @@
             <a:r>
               <a:rPr lang="zh-CN" altLang="en-US" sz="5400" dirty="0">
                 <a:solidFill>
-                  <a:schemeClr val="bg1"/>
+                  <a:srgbClr val="374153"/>
                 </a:solidFill>
                 <a:latin typeface="ACGN-MiaoGB-Flash" panose="02020300000000000000" pitchFamily="18" charset="-122"/>
                 <a:ea typeface="ACGN-MiaoGB-Flash" panose="02020300000000000000" pitchFamily="18" charset="-122"/>
@@ -28549,7 +28579,7 @@
           <p:nvPr/>
         </p:nvPicPr>
         <p:blipFill>
-          <a:blip r:embed="rId3" cstate="screen">
+          <a:blip r:embed="rId4" cstate="screen">
             <a:extLst>
               <a:ext uri="{28A0092B-C50C-407E-A947-70E740481C1C}">
                 <a14:useLocalDpi xmlns:a14="http://schemas.microsoft.com/office/drawing/2010/main"/>
@@ -28562,7 +28592,7 @@
         </p:blipFill>
         <p:spPr>
           <a:xfrm>
-            <a:off x="3121552" y="1583691"/>
+            <a:off x="3116789" y="1703085"/>
             <a:ext cx="743400" cy="743400"/>
           </a:xfrm>
           <a:prstGeom prst="ellipse">

</xml_diff>